<commit_message>
updated Socket and ppt
</commit_message>
<xml_diff>
--- a/Presentation_material/17_team_project_presentation.pptx
+++ b/Presentation_material/17_team_project_presentation.pptx
@@ -9207,18 +9207,7 @@
                 <a:ea typeface="KoPubWorld돋움체 Bold" panose="00000800000000000000" pitchFamily="2" charset="-127"/>
                 <a:cs typeface="KoPubWorld돋움체 Bold" panose="00000800000000000000" pitchFamily="2" charset="-127"/>
               </a:rPr>
-              <a:t>사람은 거짓말을 하</a:t>
-            </a:r>
-            <a:r>
-              <a:rPr lang="en-US" altLang="ko-KR" sz="1400" dirty="0">
-                <a:solidFill>
-                  <a:srgbClr val="000000"/>
-                </a:solidFill>
-                <a:latin typeface="KoPubWorld돋움체 Bold" panose="00000800000000000000" pitchFamily="2" charset="-127"/>
-                <a:ea typeface="KoPubWorld돋움체 Bold" panose="00000800000000000000" pitchFamily="2" charset="-127"/>
-                <a:cs typeface="KoPubWorld돋움체 Bold" panose="00000800000000000000" pitchFamily="2" charset="-127"/>
-              </a:rPr>
-              <a:t> </a:t>
+              <a:t>사람은 거짓말을 </a:t>
             </a:r>
             <a:r>
               <a:rPr lang="ko-KR" altLang="en-US" sz="1400" dirty="0" err="1">
@@ -9229,7 +9218,7 @@
                 <a:ea typeface="KoPubWorld돋움체 Bold" panose="00000800000000000000" pitchFamily="2" charset="-127"/>
                 <a:cs typeface="KoPubWorld돋움체 Bold" panose="00000800000000000000" pitchFamily="2" charset="-127"/>
               </a:rPr>
-              <a:t>게되면</a:t>
+              <a:t>하게되면</a:t>
             </a:r>
             <a:r>
               <a:rPr lang="ko-KR" altLang="en-US" sz="1400" dirty="0">

</xml_diff>